<commit_message>
updated UML solutions by @zeornelas
</commit_message>
<xml_diff>
--- a/_pages/teaching/solutions/uml/class/UML_Solutions.pptx
+++ b/_pages/teaching/solutions/uml/class/UML_Solutions.pptx
@@ -124,6 +124,32 @@
 </p:presentation>
 </file>
 
+<file path=ppt/commentAuthors.xml><?xml version="1.0" encoding="utf-8"?>
+<p:cmAuthorLst xmlns:a="http://schemas.openxmlformats.org/drawingml/2006/main" xmlns:r="http://schemas.openxmlformats.org/officeDocument/2006/relationships" xmlns:p="http://schemas.openxmlformats.org/presentationml/2006/main">
+  <p:cmAuthor id="1" name="José Pedro Ornelas" initials="JPO" lastIdx="1" clrIdx="0">
+    <p:extLst>
+      <p:ext uri="{19B8F6BF-5375-455C-9EA6-DF929625EA0E}">
+        <p15:presenceInfo xmlns:p15="http://schemas.microsoft.com/office/powerpoint/2012/main" userId="S::jose.p.ornelas@office365.inesctec.pt::12a6ccd7-25ce-4173-93a6-bc9de8f239b8" providerId="AD"/>
+      </p:ext>
+    </p:extLst>
+  </p:cmAuthor>
+</p:cmAuthorLst>
+</file>
+
+<file path=ppt/comments/comment1.xml><?xml version="1.0" encoding="utf-8"?>
+<p:cmLst xmlns:a="http://schemas.openxmlformats.org/drawingml/2006/main" xmlns:r="http://schemas.openxmlformats.org/officeDocument/2006/relationships" xmlns:p="http://schemas.openxmlformats.org/presentationml/2006/main">
+  <p:cm authorId="1" dt="2020-09-30T16:59:10.562" idx="1">
+    <p:pos x="10" y="10"/>
+    <p:text/>
+    <p:extLst>
+      <p:ext uri="{C676402C-5697-4E1C-873F-D02D1690AC5C}">
+        <p15:threadingInfo xmlns:p15="http://schemas.microsoft.com/office/powerpoint/2012/main" timeZoneBias="-60"/>
+      </p:ext>
+    </p:extLst>
+  </p:cm>
+</p:cmLst>
+</file>
+
 <file path=ppt/slideLayouts/slideLayout1.xml><?xml version="1.0" encoding="utf-8"?>
 <p:sldLayout xmlns:a="http://schemas.openxmlformats.org/drawingml/2006/main" xmlns:r="http://schemas.openxmlformats.org/officeDocument/2006/relationships" xmlns:p="http://schemas.openxmlformats.org/presentationml/2006/main" type="title" preserve="1">
   <p:cSld name="Title Slide">
@@ -273,7 +299,7 @@
           <a:p>
             <a:fld id="{A2B0DB41-039C-FA4B-AEA1-C2AFE43AC4F8}" type="datetimeFigureOut">
               <a:rPr lang="en-PT" smtClean="0"/>
-              <a:t>04/10/2020</a:t>
+              <a:t>07/10/2020</a:t>
             </a:fld>
             <a:endParaRPr lang="en-PT"/>
           </a:p>
@@ -473,7 +499,7 @@
           <a:p>
             <a:fld id="{A2B0DB41-039C-FA4B-AEA1-C2AFE43AC4F8}" type="datetimeFigureOut">
               <a:rPr lang="en-PT" smtClean="0"/>
-              <a:t>04/10/2020</a:t>
+              <a:t>07/10/2020</a:t>
             </a:fld>
             <a:endParaRPr lang="en-PT"/>
           </a:p>
@@ -683,7 +709,7 @@
           <a:p>
             <a:fld id="{A2B0DB41-039C-FA4B-AEA1-C2AFE43AC4F8}" type="datetimeFigureOut">
               <a:rPr lang="en-PT" smtClean="0"/>
-              <a:t>04/10/2020</a:t>
+              <a:t>07/10/2020</a:t>
             </a:fld>
             <a:endParaRPr lang="en-PT"/>
           </a:p>
@@ -883,7 +909,7 @@
           <a:p>
             <a:fld id="{A2B0DB41-039C-FA4B-AEA1-C2AFE43AC4F8}" type="datetimeFigureOut">
               <a:rPr lang="en-PT" smtClean="0"/>
-              <a:t>04/10/2020</a:t>
+              <a:t>07/10/2020</a:t>
             </a:fld>
             <a:endParaRPr lang="en-PT"/>
           </a:p>
@@ -1159,7 +1185,7 @@
           <a:p>
             <a:fld id="{A2B0DB41-039C-FA4B-AEA1-C2AFE43AC4F8}" type="datetimeFigureOut">
               <a:rPr lang="en-PT" smtClean="0"/>
-              <a:t>04/10/2020</a:t>
+              <a:t>07/10/2020</a:t>
             </a:fld>
             <a:endParaRPr lang="en-PT"/>
           </a:p>
@@ -1427,7 +1453,7 @@
           <a:p>
             <a:fld id="{A2B0DB41-039C-FA4B-AEA1-C2AFE43AC4F8}" type="datetimeFigureOut">
               <a:rPr lang="en-PT" smtClean="0"/>
-              <a:t>04/10/2020</a:t>
+              <a:t>07/10/2020</a:t>
             </a:fld>
             <a:endParaRPr lang="en-PT"/>
           </a:p>
@@ -1842,7 +1868,7 @@
           <a:p>
             <a:fld id="{A2B0DB41-039C-FA4B-AEA1-C2AFE43AC4F8}" type="datetimeFigureOut">
               <a:rPr lang="en-PT" smtClean="0"/>
-              <a:t>04/10/2020</a:t>
+              <a:t>07/10/2020</a:t>
             </a:fld>
             <a:endParaRPr lang="en-PT"/>
           </a:p>
@@ -1984,7 +2010,7 @@
           <a:p>
             <a:fld id="{A2B0DB41-039C-FA4B-AEA1-C2AFE43AC4F8}" type="datetimeFigureOut">
               <a:rPr lang="en-PT" smtClean="0"/>
-              <a:t>04/10/2020</a:t>
+              <a:t>07/10/2020</a:t>
             </a:fld>
             <a:endParaRPr lang="en-PT"/>
           </a:p>
@@ -2097,7 +2123,7 @@
           <a:p>
             <a:fld id="{A2B0DB41-039C-FA4B-AEA1-C2AFE43AC4F8}" type="datetimeFigureOut">
               <a:rPr lang="en-PT" smtClean="0"/>
-              <a:t>04/10/2020</a:t>
+              <a:t>07/10/2020</a:t>
             </a:fld>
             <a:endParaRPr lang="en-PT"/>
           </a:p>
@@ -2410,7 +2436,7 @@
           <a:p>
             <a:fld id="{A2B0DB41-039C-FA4B-AEA1-C2AFE43AC4F8}" type="datetimeFigureOut">
               <a:rPr lang="en-PT" smtClean="0"/>
-              <a:t>04/10/2020</a:t>
+              <a:t>07/10/2020</a:t>
             </a:fld>
             <a:endParaRPr lang="en-PT"/>
           </a:p>
@@ -2699,7 +2725,7 @@
           <a:p>
             <a:fld id="{A2B0DB41-039C-FA4B-AEA1-C2AFE43AC4F8}" type="datetimeFigureOut">
               <a:rPr lang="en-PT" smtClean="0"/>
-              <a:t>04/10/2020</a:t>
+              <a:t>07/10/2020</a:t>
             </a:fld>
             <a:endParaRPr lang="en-PT"/>
           </a:p>
@@ -2942,7 +2968,7 @@
           <a:p>
             <a:fld id="{A2B0DB41-039C-FA4B-AEA1-C2AFE43AC4F8}" type="datetimeFigureOut">
               <a:rPr lang="en-PT" smtClean="0"/>
-              <a:t>04/10/2020</a:t>
+              <a:t>07/10/2020</a:t>
             </a:fld>
             <a:endParaRPr lang="en-PT"/>
           </a:p>
@@ -3406,7 +3432,7 @@
         <p:spPr/>
         <p:txBody>
           <a:bodyPr>
-            <a:normAutofit fontScale="92500" lnSpcReduction="10000"/>
+            <a:normAutofit lnSpcReduction="10000"/>
           </a:bodyPr>
           <a:lstStyle/>
           <a:p>
@@ -3422,14 +3448,11 @@
               </a:rPr>
               <a:t>zeornelas@fe.up.pt</a:t>
             </a:r>
-            <a:br>
-              <a:rPr lang="en-PT" dirty="0"/>
-            </a:br>
-            <a:br>
-              <a:rPr lang="en-PT" dirty="0"/>
-            </a:br>
+            <a:endParaRPr lang="en-PT" dirty="0"/>
+          </a:p>
+          <a:p>
             <a:r>
-              <a:rPr lang="en-PT" dirty="0"/>
+              <a:rPr lang="en-GB" dirty="0"/>
               <a:t>LinkedIn: </a:t>
             </a:r>
             <a:r>
@@ -3438,13 +3461,9 @@
               </a:rPr>
               <a:t>https://www.linkedin.com/in/josé-pedro-ornelas/</a:t>
             </a:r>
-            <a:r>
-              <a:rPr lang="en-GB" dirty="0"/>
-              <a:t> </a:t>
-            </a:r>
-            <a:br>
-              <a:rPr lang="en-GB" dirty="0"/>
-            </a:br>
+            <a:endParaRPr lang="en-GB" dirty="0"/>
+          </a:p>
+          <a:p>
             <a:r>
               <a:rPr lang="en-GB" dirty="0"/>
               <a:t>GitHub: </a:t>
@@ -3455,10 +3474,9 @@
               </a:rPr>
               <a:t>https://github.com/zeornelas</a:t>
             </a:r>
-            <a:r>
-              <a:rPr lang="en-GB" dirty="0"/>
-              <a:t> </a:t>
-            </a:r>
+            <a:endParaRPr lang="en-GB" dirty="0"/>
+          </a:p>
+          <a:p>
             <a:endParaRPr lang="en-PT" dirty="0"/>
           </a:p>
         </p:txBody>
@@ -7665,6 +7683,108 @@
           </a:p>
         </p:txBody>
       </p:sp>
+      <p:sp>
+        <p:nvSpPr>
+          <p:cNvPr id="2" name="TextBox 1">
+            <a:extLst>
+              <a:ext uri="{FF2B5EF4-FFF2-40B4-BE49-F238E27FC236}">
+                <a16:creationId xmlns:a16="http://schemas.microsoft.com/office/drawing/2014/main" id="{3B9DF5FD-A03A-FF44-929E-85CA68E4FD9F}"/>
+              </a:ext>
+            </a:extLst>
+          </p:cNvPr>
+          <p:cNvSpPr txBox="1"/>
+          <p:nvPr/>
+        </p:nvSpPr>
+        <p:spPr>
+          <a:xfrm>
+            <a:off x="7635909" y="5553130"/>
+            <a:ext cx="2718054" cy="646331"/>
+          </a:xfrm>
+          <a:prstGeom prst="rect">
+            <a:avLst/>
+          </a:prstGeom>
+          <a:noFill/>
+        </p:spPr>
+        <p:txBody>
+          <a:bodyPr wrap="square" rtlCol="0">
+            <a:spAutoFit/>
+          </a:bodyPr>
+          <a:lstStyle/>
+          <a:p>
+            <a:r>
+              <a:rPr lang="en-PT" dirty="0"/>
+              <a:t>{type should be in [</a:t>
+            </a:r>
+            <a:r>
+              <a:rPr lang="en-GB" dirty="0"/>
+              <a:t>road, mountain, </a:t>
+            </a:r>
+            <a:r>
+              <a:rPr lang="en-GB" dirty="0" err="1"/>
+              <a:t>bmx</a:t>
+            </a:r>
+            <a:r>
+              <a:rPr lang="en-GB" dirty="0"/>
+              <a:t> or hybrid]</a:t>
+            </a:r>
+            <a:r>
+              <a:rPr lang="en-PT" dirty="0"/>
+              <a:t>}</a:t>
+            </a:r>
+          </a:p>
+        </p:txBody>
+      </p:sp>
+      <p:sp>
+        <p:nvSpPr>
+          <p:cNvPr id="25" name="TextBox 24">
+            <a:extLst>
+              <a:ext uri="{FF2B5EF4-FFF2-40B4-BE49-F238E27FC236}">
+                <a16:creationId xmlns:a16="http://schemas.microsoft.com/office/drawing/2014/main" id="{252C1335-EC45-E043-92D5-9DCBB3A40268}"/>
+              </a:ext>
+            </a:extLst>
+          </p:cNvPr>
+          <p:cNvSpPr txBox="1"/>
+          <p:nvPr/>
+        </p:nvSpPr>
+        <p:spPr>
+          <a:xfrm>
+            <a:off x="5464887" y="696041"/>
+            <a:ext cx="2718054" cy="646331"/>
+          </a:xfrm>
+          <a:prstGeom prst="rect">
+            <a:avLst/>
+          </a:prstGeom>
+          <a:noFill/>
+        </p:spPr>
+        <p:txBody>
+          <a:bodyPr wrap="square" rtlCol="0">
+            <a:spAutoFit/>
+          </a:bodyPr>
+          <a:lstStyle/>
+          <a:p>
+            <a:r>
+              <a:rPr lang="en-PT" dirty="0"/>
+              <a:t>{</a:t>
+            </a:r>
+            <a:r>
+              <a:rPr lang="pt-PT" dirty="0" err="1"/>
+              <a:t>Return_Day</a:t>
+            </a:r>
+            <a:r>
+              <a:rPr lang="pt-PT" dirty="0"/>
+              <a:t> &gt;= </a:t>
+            </a:r>
+            <a:r>
+              <a:rPr lang="pt-PT" dirty="0" err="1"/>
+              <a:t>Pickup_Day</a:t>
+            </a:r>
+            <a:r>
+              <a:rPr lang="en-PT" dirty="0"/>
+              <a:t>}</a:t>
+            </a:r>
+          </a:p>
+        </p:txBody>
+      </p:sp>
     </p:spTree>
     <p:extLst>
       <p:ext uri="{BB962C8B-B14F-4D97-AF65-F5344CB8AC3E}">
@@ -8457,6 +8577,96 @@
                       </p:childTnLst>
                     </p:cTn>
                   </p:par>
+                  <p:par>
+                    <p:cTn id="67" fill="hold">
+                      <p:stCondLst>
+                        <p:cond delay="indefinite"/>
+                      </p:stCondLst>
+                      <p:childTnLst>
+                        <p:par>
+                          <p:cTn id="68" fill="hold">
+                            <p:stCondLst>
+                              <p:cond delay="0"/>
+                            </p:stCondLst>
+                            <p:childTnLst>
+                              <p:par>
+                                <p:cTn id="69" presetID="1" presetClass="entr" presetSubtype="0" fill="hold" grpId="0" nodeType="clickEffect">
+                                  <p:stCondLst>
+                                    <p:cond delay="0"/>
+                                  </p:stCondLst>
+                                  <p:childTnLst>
+                                    <p:set>
+                                      <p:cBhvr>
+                                        <p:cTn id="70" dur="1" fill="hold">
+                                          <p:stCondLst>
+                                            <p:cond delay="0"/>
+                                          </p:stCondLst>
+                                        </p:cTn>
+                                        <p:tgtEl>
+                                          <p:spTgt spid="2"/>
+                                        </p:tgtEl>
+                                        <p:attrNameLst>
+                                          <p:attrName>style.visibility</p:attrName>
+                                        </p:attrNameLst>
+                                      </p:cBhvr>
+                                      <p:to>
+                                        <p:strVal val="visible"/>
+                                      </p:to>
+                                    </p:set>
+                                  </p:childTnLst>
+                                </p:cTn>
+                              </p:par>
+                            </p:childTnLst>
+                          </p:cTn>
+                        </p:par>
+                      </p:childTnLst>
+                    </p:cTn>
+                  </p:par>
+                  <p:par>
+                    <p:cTn id="71" fill="hold">
+                      <p:stCondLst>
+                        <p:cond delay="indefinite"/>
+                      </p:stCondLst>
+                      <p:childTnLst>
+                        <p:par>
+                          <p:cTn id="72" fill="hold">
+                            <p:stCondLst>
+                              <p:cond delay="0"/>
+                            </p:stCondLst>
+                            <p:childTnLst>
+                              <p:par>
+                                <p:cTn id="73" presetID="1" presetClass="entr" presetSubtype="0" fill="hold" grpId="0" nodeType="clickEffect">
+                                  <p:stCondLst>
+                                    <p:cond delay="0"/>
+                                  </p:stCondLst>
+                                  <p:childTnLst>
+                                    <p:set>
+                                      <p:cBhvr>
+                                        <p:cTn id="74" dur="1" fill="hold">
+                                          <p:stCondLst>
+                                            <p:cond delay="0"/>
+                                          </p:stCondLst>
+                                        </p:cTn>
+                                        <p:tgtEl>
+                                          <p:spTgt spid="25"/>
+                                        </p:tgtEl>
+                                        <p:attrNameLst>
+                                          <p:attrName>style.visibility</p:attrName>
+                                        </p:attrNameLst>
+                                      </p:cBhvr>
+                                      <p:to>
+                                        <p:strVal val="visible"/>
+                                      </p:to>
+                                    </p:set>
+                                  </p:childTnLst>
+                                </p:cTn>
+                              </p:par>
+                            </p:childTnLst>
+                          </p:cTn>
+                        </p:par>
+                      </p:childTnLst>
+                    </p:cTn>
+                  </p:par>
                 </p:childTnLst>
               </p:cTn>
               <p:prevCondLst>
@@ -8491,6 +8701,8 @@
       <p:bldP spid="50" grpId="0"/>
       <p:bldP spid="52" grpId="0"/>
       <p:bldP spid="53" grpId="0"/>
+      <p:bldP spid="2" grpId="0"/>
+      <p:bldP spid="25" grpId="0"/>
     </p:bldLst>
   </p:timing>
 </p:sld>
@@ -8784,14 +8996,14 @@
           <p:nvPr>
             <p:extLst>
               <p:ext uri="{D42A27DB-BD31-4B8C-83A1-F6EECF244321}">
-                <p14:modId xmlns:p14="http://schemas.microsoft.com/office/powerpoint/2010/main" val="3467411085"/>
+                <p14:modId xmlns:p14="http://schemas.microsoft.com/office/powerpoint/2010/main" val="3334595287"/>
               </p:ext>
             </p:extLst>
           </p:nvPr>
         </p:nvGraphicFramePr>
         <p:xfrm>
-          <a:off x="7900115" y="172735"/>
-          <a:ext cx="1147036" cy="1109134"/>
+          <a:off x="7900114" y="172735"/>
+          <a:ext cx="2016371" cy="1109134"/>
         </p:xfrm>
         <a:graphic>
           <a:graphicData uri="http://schemas.openxmlformats.org/drawingml/2006/table">
@@ -8800,7 +9012,7 @@
                 <a:tableStyleId>{5C22544A-7EE6-4342-B048-85BDC9FD1C3A}</a:tableStyleId>
               </a:tblPr>
               <a:tblGrid>
-                <a:gridCol w="1147036">
+                <a:gridCol w="2016371">
                   <a:extLst>
                     <a:ext uri="{9D8B030D-6E8A-4147-A177-3AD203B41FA5}">
                       <a16:colId xmlns:a16="http://schemas.microsoft.com/office/drawing/2014/main" val="3798357808"/>
@@ -8836,7 +9048,13 @@
                     <a:p>
                       <a:r>
                         <a:rPr lang="en-PT" dirty="0"/>
-                        <a:t>NAME</a:t>
+                        <a:t>COMMON_NAME</a:t>
+                      </a:r>
+                    </a:p>
+                    <a:p>
+                      <a:r>
+                        <a:rPr lang="en-PT" dirty="0"/>
+                        <a:t>SCI_NAME</a:t>
                       </a:r>
                     </a:p>
                   </a:txBody>
@@ -9264,7 +9482,7 @@
         <p:spPr>
           <a:xfrm>
             <a:off x="5600346" y="727302"/>
-            <a:ext cx="2299769" cy="0"/>
+            <a:ext cx="2299768" cy="0"/>
           </a:xfrm>
           <a:prstGeom prst="line">
             <a:avLst/>
@@ -9443,8 +9661,8 @@
         </p:nvCxnSpPr>
         <p:spPr>
           <a:xfrm rot="5400000" flipH="1" flipV="1">
-            <a:off x="6510751" y="-48230"/>
-            <a:ext cx="632783" cy="3292982"/>
+            <a:off x="6728084" y="-265563"/>
+            <a:ext cx="632783" cy="3727648"/>
           </a:xfrm>
           <a:prstGeom prst="bentConnector3">
             <a:avLst>
@@ -9853,7 +10071,7 @@
         <p:spPr>
           <a:xfrm>
             <a:off x="2886752" y="5171455"/>
-            <a:ext cx="306051" cy="369332"/>
+            <a:ext cx="598891" cy="369332"/>
           </a:xfrm>
           <a:prstGeom prst="rect">
             <a:avLst/>
@@ -9868,7 +10086,7 @@
           <a:p>
             <a:r>
               <a:rPr lang="en-PT" dirty="0"/>
-              <a:t>1</a:t>
+              <a:t>0..1</a:t>
             </a:r>
           </a:p>
         </p:txBody>

</xml_diff>